<commit_message>
Final presentation: drafted some more slides about PROJECT PLAN.
</commit_message>
<xml_diff>
--- a/Final Presentation/Presentation.pptx
+++ b/Final Presentation/Presentation.pptx
@@ -18,6 +18,10 @@
     <p:sldId id="271" r:id="rId12"/>
     <p:sldId id="272" r:id="rId13"/>
     <p:sldId id="274" r:id="rId14"/>
+    <p:sldId id="275" r:id="rId15"/>
+    <p:sldId id="277" r:id="rId16"/>
+    <p:sldId id="278" r:id="rId17"/>
+    <p:sldId id="276" r:id="rId18"/>
   </p:sldIdLst>
   <p:sldSz cx="12192000" cy="6858000"/>
   <p:notesSz cx="6858000" cy="9144000"/>
@@ -255,7 +259,7 @@
           <a:p>
             <a:fld id="{8BA09A03-D57A-44AC-B23C-41C77AA6B08B}" type="datetimeFigureOut">
               <a:rPr lang="en-US" smtClean="0"/>
-              <a:t>2/11/2016</a:t>
+              <a:t>2/12/2016</a:t>
             </a:fld>
             <a:endParaRPr lang="en-US"/>
           </a:p>
@@ -297,7 +301,7 @@
           <a:p>
             <a:fld id="{C937D3E4-18B8-4631-843B-29216B07B050}" type="slidenum">
               <a:rPr lang="en-US" smtClean="0"/>
-              <a:t>‹N›</a:t>
+              <a:t>‹#›</a:t>
             </a:fld>
             <a:endParaRPr lang="en-US"/>
           </a:p>
@@ -425,7 +429,7 @@
           <a:p>
             <a:fld id="{8BA09A03-D57A-44AC-B23C-41C77AA6B08B}" type="datetimeFigureOut">
               <a:rPr lang="en-US" smtClean="0"/>
-              <a:t>2/11/2016</a:t>
+              <a:t>2/12/2016</a:t>
             </a:fld>
             <a:endParaRPr lang="en-US"/>
           </a:p>
@@ -467,7 +471,7 @@
           <a:p>
             <a:fld id="{C937D3E4-18B8-4631-843B-29216B07B050}" type="slidenum">
               <a:rPr lang="en-US" smtClean="0"/>
-              <a:t>‹N›</a:t>
+              <a:t>‹#›</a:t>
             </a:fld>
             <a:endParaRPr lang="en-US"/>
           </a:p>
@@ -605,7 +609,7 @@
           <a:p>
             <a:fld id="{8BA09A03-D57A-44AC-B23C-41C77AA6B08B}" type="datetimeFigureOut">
               <a:rPr lang="en-US" smtClean="0"/>
-              <a:t>2/11/2016</a:t>
+              <a:t>2/12/2016</a:t>
             </a:fld>
             <a:endParaRPr lang="en-US"/>
           </a:p>
@@ -647,7 +651,7 @@
           <a:p>
             <a:fld id="{C937D3E4-18B8-4631-843B-29216B07B050}" type="slidenum">
               <a:rPr lang="en-US" smtClean="0"/>
-              <a:t>‹N›</a:t>
+              <a:t>‹#›</a:t>
             </a:fld>
             <a:endParaRPr lang="en-US"/>
           </a:p>
@@ -812,7 +816,7 @@
           <a:p>
             <a:fld id="{8BA09A03-D57A-44AC-B23C-41C77AA6B08B}" type="datetimeFigureOut">
               <a:rPr lang="en-US" smtClean="0"/>
-              <a:t>2/11/2016</a:t>
+              <a:t>2/12/2016</a:t>
             </a:fld>
             <a:endParaRPr lang="en-US"/>
           </a:p>
@@ -854,7 +858,7 @@
           <a:p>
             <a:fld id="{C937D3E4-18B8-4631-843B-29216B07B050}" type="slidenum">
               <a:rPr lang="en-US" smtClean="0"/>
-              <a:t>‹N›</a:t>
+              <a:t>‹#›</a:t>
             </a:fld>
             <a:endParaRPr lang="en-US"/>
           </a:p>
@@ -1109,7 +1113,7 @@
           <a:p>
             <a:fld id="{8BA09A03-D57A-44AC-B23C-41C77AA6B08B}" type="datetimeFigureOut">
               <a:rPr lang="en-US" smtClean="0"/>
-              <a:t>2/11/2016</a:t>
+              <a:t>2/12/2016</a:t>
             </a:fld>
             <a:endParaRPr lang="en-US"/>
           </a:p>
@@ -1151,7 +1155,7 @@
           <a:p>
             <a:fld id="{C937D3E4-18B8-4631-843B-29216B07B050}" type="slidenum">
               <a:rPr lang="en-US" smtClean="0"/>
-              <a:t>‹N›</a:t>
+              <a:t>‹#›</a:t>
             </a:fld>
             <a:endParaRPr lang="en-US"/>
           </a:p>
@@ -1341,7 +1345,7 @@
           <a:p>
             <a:fld id="{8BA09A03-D57A-44AC-B23C-41C77AA6B08B}" type="datetimeFigureOut">
               <a:rPr lang="en-US" smtClean="0"/>
-              <a:t>2/11/2016</a:t>
+              <a:t>2/12/2016</a:t>
             </a:fld>
             <a:endParaRPr lang="en-US"/>
           </a:p>
@@ -1383,7 +1387,7 @@
           <a:p>
             <a:fld id="{C937D3E4-18B8-4631-843B-29216B07B050}" type="slidenum">
               <a:rPr lang="en-US" smtClean="0"/>
-              <a:t>‹N›</a:t>
+              <a:t>‹#›</a:t>
             </a:fld>
             <a:endParaRPr lang="en-US"/>
           </a:p>
@@ -1708,7 +1712,7 @@
           <a:p>
             <a:fld id="{8BA09A03-D57A-44AC-B23C-41C77AA6B08B}" type="datetimeFigureOut">
               <a:rPr lang="en-US" smtClean="0"/>
-              <a:t>2/11/2016</a:t>
+              <a:t>2/12/2016</a:t>
             </a:fld>
             <a:endParaRPr lang="en-US"/>
           </a:p>
@@ -1750,7 +1754,7 @@
           <a:p>
             <a:fld id="{C937D3E4-18B8-4631-843B-29216B07B050}" type="slidenum">
               <a:rPr lang="en-US" smtClean="0"/>
-              <a:t>‹N›</a:t>
+              <a:t>‹#›</a:t>
             </a:fld>
             <a:endParaRPr lang="en-US"/>
           </a:p>
@@ -1826,7 +1830,7 @@
           <a:p>
             <a:fld id="{8BA09A03-D57A-44AC-B23C-41C77AA6B08B}" type="datetimeFigureOut">
               <a:rPr lang="en-US" smtClean="0"/>
-              <a:t>2/11/2016</a:t>
+              <a:t>2/12/2016</a:t>
             </a:fld>
             <a:endParaRPr lang="en-US"/>
           </a:p>
@@ -1868,7 +1872,7 @@
           <a:p>
             <a:fld id="{C937D3E4-18B8-4631-843B-29216B07B050}" type="slidenum">
               <a:rPr lang="en-US" smtClean="0"/>
-              <a:t>‹N›</a:t>
+              <a:t>‹#›</a:t>
             </a:fld>
             <a:endParaRPr lang="en-US"/>
           </a:p>
@@ -1921,7 +1925,7 @@
           <a:p>
             <a:fld id="{8BA09A03-D57A-44AC-B23C-41C77AA6B08B}" type="datetimeFigureOut">
               <a:rPr lang="en-US" smtClean="0"/>
-              <a:t>2/11/2016</a:t>
+              <a:t>2/12/2016</a:t>
             </a:fld>
             <a:endParaRPr lang="en-US"/>
           </a:p>
@@ -1963,7 +1967,7 @@
           <a:p>
             <a:fld id="{C937D3E4-18B8-4631-843B-29216B07B050}" type="slidenum">
               <a:rPr lang="en-US" smtClean="0"/>
-              <a:t>‹N›</a:t>
+              <a:t>‹#›</a:t>
             </a:fld>
             <a:endParaRPr lang="en-US"/>
           </a:p>
@@ -2198,7 +2202,7 @@
           <a:p>
             <a:fld id="{8BA09A03-D57A-44AC-B23C-41C77AA6B08B}" type="datetimeFigureOut">
               <a:rPr lang="en-US" smtClean="0"/>
-              <a:t>2/11/2016</a:t>
+              <a:t>2/12/2016</a:t>
             </a:fld>
             <a:endParaRPr lang="en-US"/>
           </a:p>
@@ -2240,7 +2244,7 @@
           <a:p>
             <a:fld id="{C937D3E4-18B8-4631-843B-29216B07B050}" type="slidenum">
               <a:rPr lang="en-US" smtClean="0"/>
-              <a:t>‹N›</a:t>
+              <a:t>‹#›</a:t>
             </a:fld>
             <a:endParaRPr lang="en-US"/>
           </a:p>
@@ -2451,7 +2455,7 @@
           <a:p>
             <a:fld id="{8BA09A03-D57A-44AC-B23C-41C77AA6B08B}" type="datetimeFigureOut">
               <a:rPr lang="en-US" smtClean="0"/>
-              <a:t>2/11/2016</a:t>
+              <a:t>2/12/2016</a:t>
             </a:fld>
             <a:endParaRPr lang="en-US"/>
           </a:p>
@@ -2493,7 +2497,7 @@
           <a:p>
             <a:fld id="{C937D3E4-18B8-4631-843B-29216B07B050}" type="slidenum">
               <a:rPr lang="en-US" smtClean="0"/>
-              <a:t>‹N›</a:t>
+              <a:t>‹#›</a:t>
             </a:fld>
             <a:endParaRPr lang="en-US"/>
           </a:p>
@@ -2664,7 +2668,7 @@
           <a:p>
             <a:fld id="{8BA09A03-D57A-44AC-B23C-41C77AA6B08B}" type="datetimeFigureOut">
               <a:rPr lang="en-US" smtClean="0"/>
-              <a:t>2/11/2016</a:t>
+              <a:t>2/12/2016</a:t>
             </a:fld>
             <a:endParaRPr lang="en-US"/>
           </a:p>
@@ -2742,7 +2746,7 @@
           <a:p>
             <a:fld id="{C937D3E4-18B8-4631-843B-29216B07B050}" type="slidenum">
               <a:rPr lang="en-US" smtClean="0"/>
-              <a:t>‹N›</a:t>
+              <a:t>‹#›</a:t>
             </a:fld>
             <a:endParaRPr lang="en-US"/>
           </a:p>
@@ -3416,6 +3420,328 @@
 </p:sld>
 </file>
 
+<file path=ppt/slides/slide14.xml><?xml version="1.0" encoding="utf-8"?>
+<p:sld xmlns:a="http://schemas.openxmlformats.org/drawingml/2006/main" xmlns:r="http://schemas.openxmlformats.org/officeDocument/2006/relationships" xmlns:p="http://schemas.openxmlformats.org/presentationml/2006/main">
+  <p:cSld>
+    <p:spTree>
+      <p:nvGrpSpPr>
+        <p:cNvPr id="1" name=""/>
+        <p:cNvGrpSpPr/>
+        <p:nvPr/>
+      </p:nvGrpSpPr>
+      <p:grpSpPr>
+        <a:xfrm>
+          <a:off x="0" y="0"/>
+          <a:ext cx="0" cy="0"/>
+          <a:chOff x="0" y="0"/>
+          <a:chExt cx="0" cy="0"/>
+        </a:xfrm>
+      </p:grpSpPr>
+      <p:sp>
+        <p:nvSpPr>
+          <p:cNvPr id="2" name="Title 1"/>
+          <p:cNvSpPr>
+            <a:spLocks noGrp="1"/>
+          </p:cNvSpPr>
+          <p:nvPr>
+            <p:ph type="title"/>
+          </p:nvPr>
+        </p:nvSpPr>
+        <p:spPr/>
+        <p:txBody>
+          <a:bodyPr/>
+          <a:lstStyle/>
+          <a:p>
+            <a:r>
+              <a:rPr lang="en-US" dirty="0" smtClean="0"/>
+              <a:t>PLACEHOLDER FOR INTEGRATION TEST DOCUMENT </a:t>
+            </a:r>
+            <a:endParaRPr lang="en-US" dirty="0"/>
+          </a:p>
+        </p:txBody>
+      </p:sp>
+      <p:sp>
+        <p:nvSpPr>
+          <p:cNvPr id="3" name="Content Placeholder 2"/>
+          <p:cNvSpPr>
+            <a:spLocks noGrp="1"/>
+          </p:cNvSpPr>
+          <p:nvPr>
+            <p:ph idx="1"/>
+          </p:nvPr>
+        </p:nvSpPr>
+        <p:spPr/>
+        <p:txBody>
+          <a:bodyPr/>
+          <a:lstStyle/>
+          <a:p>
+            <a:endParaRPr lang="en-US"/>
+          </a:p>
+        </p:txBody>
+      </p:sp>
+    </p:spTree>
+    <p:extLst>
+      <p:ext uri="{BB962C8B-B14F-4D97-AF65-F5344CB8AC3E}">
+        <p14:creationId xmlns:p14="http://schemas.microsoft.com/office/powerpoint/2010/main" val="2708023137"/>
+      </p:ext>
+    </p:extLst>
+  </p:cSld>
+  <p:clrMapOvr>
+    <a:masterClrMapping/>
+  </p:clrMapOvr>
+</p:sld>
+</file>
+
+<file path=ppt/slides/slide15.xml><?xml version="1.0" encoding="utf-8"?>
+<p:sld xmlns:a="http://schemas.openxmlformats.org/drawingml/2006/main" xmlns:r="http://schemas.openxmlformats.org/officeDocument/2006/relationships" xmlns:p="http://schemas.openxmlformats.org/presentationml/2006/main">
+  <p:cSld>
+    <p:spTree>
+      <p:nvGrpSpPr>
+        <p:cNvPr id="1" name=""/>
+        <p:cNvGrpSpPr/>
+        <p:nvPr/>
+      </p:nvGrpSpPr>
+      <p:grpSpPr>
+        <a:xfrm>
+          <a:off x="0" y="0"/>
+          <a:ext cx="0" cy="0"/>
+          <a:chOff x="0" y="0"/>
+          <a:chExt cx="0" cy="0"/>
+        </a:xfrm>
+      </p:grpSpPr>
+      <p:sp>
+        <p:nvSpPr>
+          <p:cNvPr id="2" name="Title 1"/>
+          <p:cNvSpPr>
+            <a:spLocks noGrp="1"/>
+          </p:cNvSpPr>
+          <p:nvPr>
+            <p:ph type="title"/>
+          </p:nvPr>
+        </p:nvSpPr>
+        <p:spPr/>
+        <p:txBody>
+          <a:bodyPr/>
+          <a:lstStyle/>
+          <a:p>
+            <a:r>
+              <a:rPr lang="it-IT" dirty="0" smtClean="0"/>
+              <a:t>COCOMO II - SETTINGS</a:t>
+            </a:r>
+            <a:endParaRPr lang="en-US" dirty="0"/>
+          </a:p>
+        </p:txBody>
+      </p:sp>
+      <p:pic>
+        <p:nvPicPr>
+          <p:cNvPr id="4" name="Content Placeholder 3"/>
+          <p:cNvPicPr>
+            <a:picLocks noGrp="1" noChangeAspect="1"/>
+          </p:cNvPicPr>
+          <p:nvPr>
+            <p:ph idx="1"/>
+          </p:nvPr>
+        </p:nvPicPr>
+        <p:blipFill>
+          <a:blip r:embed="rId2">
+            <a:extLst>
+              <a:ext uri="{28A0092B-C50C-407E-A947-70E740481C1C}">
+                <a14:useLocalDpi xmlns:a14="http://schemas.microsoft.com/office/drawing/2010/main" val="0"/>
+              </a:ext>
+            </a:extLst>
+          </a:blip>
+          <a:stretch>
+            <a:fillRect/>
+          </a:stretch>
+        </p:blipFill>
+        <p:spPr>
+          <a:xfrm>
+            <a:off x="2881414" y="1855626"/>
+            <a:ext cx="6429172" cy="4830931"/>
+          </a:xfrm>
+        </p:spPr>
+      </p:pic>
+    </p:spTree>
+    <p:extLst>
+      <p:ext uri="{BB962C8B-B14F-4D97-AF65-F5344CB8AC3E}">
+        <p14:creationId xmlns:p14="http://schemas.microsoft.com/office/powerpoint/2010/main" val="2578760370"/>
+      </p:ext>
+    </p:extLst>
+  </p:cSld>
+  <p:clrMapOvr>
+    <a:masterClrMapping/>
+  </p:clrMapOvr>
+</p:sld>
+</file>
+
+<file path=ppt/slides/slide16.xml><?xml version="1.0" encoding="utf-8"?>
+<p:sld xmlns:a="http://schemas.openxmlformats.org/drawingml/2006/main" xmlns:r="http://schemas.openxmlformats.org/officeDocument/2006/relationships" xmlns:p="http://schemas.openxmlformats.org/presentationml/2006/main">
+  <p:cSld>
+    <p:spTree>
+      <p:nvGrpSpPr>
+        <p:cNvPr id="1" name=""/>
+        <p:cNvGrpSpPr/>
+        <p:nvPr/>
+      </p:nvGrpSpPr>
+      <p:grpSpPr>
+        <a:xfrm>
+          <a:off x="0" y="0"/>
+          <a:ext cx="0" cy="0"/>
+          <a:chOff x="0" y="0"/>
+          <a:chExt cx="0" cy="0"/>
+        </a:xfrm>
+      </p:grpSpPr>
+      <p:sp>
+        <p:nvSpPr>
+          <p:cNvPr id="2" name="Title 1"/>
+          <p:cNvSpPr>
+            <a:spLocks noGrp="1"/>
+          </p:cNvSpPr>
+          <p:nvPr>
+            <p:ph type="title"/>
+          </p:nvPr>
+        </p:nvSpPr>
+        <p:spPr/>
+        <p:txBody>
+          <a:bodyPr/>
+          <a:lstStyle/>
+          <a:p>
+            <a:r>
+              <a:rPr lang="it-IT" dirty="0" smtClean="0"/>
+              <a:t>COCOMO II - RESULT</a:t>
+            </a:r>
+            <a:endParaRPr lang="en-US" dirty="0"/>
+          </a:p>
+        </p:txBody>
+      </p:sp>
+      <p:pic>
+        <p:nvPicPr>
+          <p:cNvPr id="4" name="Content Placeholder 3"/>
+          <p:cNvPicPr>
+            <a:picLocks noGrp="1" noChangeAspect="1"/>
+          </p:cNvPicPr>
+          <p:nvPr>
+            <p:ph idx="1"/>
+          </p:nvPr>
+        </p:nvPicPr>
+        <p:blipFill>
+          <a:blip r:embed="rId2">
+            <a:extLst>
+              <a:ext uri="{28A0092B-C50C-407E-A947-70E740481C1C}">
+                <a14:useLocalDpi xmlns:a14="http://schemas.microsoft.com/office/drawing/2010/main" val="0"/>
+              </a:ext>
+            </a:extLst>
+          </a:blip>
+          <a:stretch>
+            <a:fillRect/>
+          </a:stretch>
+        </p:blipFill>
+        <p:spPr>
+          <a:xfrm>
+            <a:off x="3039657" y="1724420"/>
+            <a:ext cx="6112687" cy="5068676"/>
+          </a:xfrm>
+        </p:spPr>
+      </p:pic>
+    </p:spTree>
+    <p:extLst>
+      <p:ext uri="{BB962C8B-B14F-4D97-AF65-F5344CB8AC3E}">
+        <p14:creationId xmlns:p14="http://schemas.microsoft.com/office/powerpoint/2010/main" val="1447540669"/>
+      </p:ext>
+    </p:extLst>
+  </p:cSld>
+  <p:clrMapOvr>
+    <a:masterClrMapping/>
+  </p:clrMapOvr>
+</p:sld>
+</file>
+
+<file path=ppt/slides/slide17.xml><?xml version="1.0" encoding="utf-8"?>
+<p:sld xmlns:a="http://schemas.openxmlformats.org/drawingml/2006/main" xmlns:r="http://schemas.openxmlformats.org/officeDocument/2006/relationships" xmlns:p="http://schemas.openxmlformats.org/presentationml/2006/main">
+  <p:cSld>
+    <p:spTree>
+      <p:nvGrpSpPr>
+        <p:cNvPr id="1" name=""/>
+        <p:cNvGrpSpPr/>
+        <p:nvPr/>
+      </p:nvGrpSpPr>
+      <p:grpSpPr>
+        <a:xfrm>
+          <a:off x="0" y="0"/>
+          <a:ext cx="0" cy="0"/>
+          <a:chOff x="0" y="0"/>
+          <a:chExt cx="0" cy="0"/>
+        </a:xfrm>
+      </p:grpSpPr>
+      <p:sp>
+        <p:nvSpPr>
+          <p:cNvPr id="2" name="Title 1"/>
+          <p:cNvSpPr>
+            <a:spLocks noGrp="1"/>
+          </p:cNvSpPr>
+          <p:nvPr>
+            <p:ph type="title"/>
+          </p:nvPr>
+        </p:nvSpPr>
+        <p:spPr>
+          <a:xfrm>
+            <a:off x="700644" y="365125"/>
+            <a:ext cx="10759044" cy="1325563"/>
+          </a:xfrm>
+        </p:spPr>
+        <p:txBody>
+          <a:bodyPr/>
+          <a:lstStyle/>
+          <a:p>
+            <a:r>
+              <a:rPr lang="en-US" dirty="0" smtClean="0"/>
+              <a:t>TASK SCHEDULING &amp; RESOURCES ALLOCATION</a:t>
+            </a:r>
+            <a:endParaRPr lang="en-US" dirty="0"/>
+          </a:p>
+        </p:txBody>
+      </p:sp>
+      <p:pic>
+        <p:nvPicPr>
+          <p:cNvPr id="4" name="Content Placeholder 3"/>
+          <p:cNvPicPr>
+            <a:picLocks noGrp="1" noChangeAspect="1"/>
+          </p:cNvPicPr>
+          <p:nvPr>
+            <p:ph idx="1"/>
+          </p:nvPr>
+        </p:nvPicPr>
+        <p:blipFill rotWithShape="1">
+          <a:blip r:embed="rId2">
+            <a:extLst>
+              <a:ext uri="{28A0092B-C50C-407E-A947-70E740481C1C}">
+                <a14:useLocalDpi xmlns:a14="http://schemas.microsoft.com/office/drawing/2010/main" val="0"/>
+              </a:ext>
+            </a:extLst>
+          </a:blip>
+          <a:srcRect l="2269"/>
+          <a:stretch/>
+        </p:blipFill>
+        <p:spPr>
+          <a:xfrm>
+            <a:off x="1228918" y="1903538"/>
+            <a:ext cx="9734165" cy="4700042"/>
+          </a:xfrm>
+        </p:spPr>
+      </p:pic>
+    </p:spTree>
+    <p:extLst>
+      <p:ext uri="{BB962C8B-B14F-4D97-AF65-F5344CB8AC3E}">
+        <p14:creationId xmlns:p14="http://schemas.microsoft.com/office/powerpoint/2010/main" val="28564540"/>
+      </p:ext>
+    </p:extLst>
+  </p:cSld>
+  <p:clrMapOvr>
+    <a:masterClrMapping/>
+  </p:clrMapOvr>
+</p:sld>
+</file>
+
 <file path=ppt/slides/slide2.xml><?xml version="1.0" encoding="utf-8"?>
 <p:sld xmlns:a="http://schemas.openxmlformats.org/drawingml/2006/main" xmlns:r="http://schemas.openxmlformats.org/officeDocument/2006/relationships" xmlns:p="http://schemas.openxmlformats.org/presentationml/2006/main">
   <p:cSld>
@@ -3538,9 +3864,6 @@
               </a:rPr>
               <a:t>Administrator</a:t>
             </a:r>
-            <a:endParaRPr lang="it-IT" dirty="0">
-              <a:latin typeface="Calibri" panose="020F0502020204030204" pitchFamily="34" charset="0"/>
-            </a:endParaRPr>
           </a:p>
         </p:txBody>
       </p:sp>

</xml_diff>

<commit_message>
Final presentation: font corrected
</commit_message>
<xml_diff>
--- a/Final Presentation/Presentation.pptx
+++ b/Final Presentation/Presentation.pptx
@@ -1,6 +1,6 @@
 
 <file path=ppt/presentation.xml><?xml version="1.0" encoding="utf-8"?>
-<p:presentation xmlns:a="http://schemas.openxmlformats.org/drawingml/2006/main" xmlns:r="http://schemas.openxmlformats.org/officeDocument/2006/relationships" xmlns:p="http://schemas.openxmlformats.org/presentationml/2006/main" saveSubsetFonts="1">
+<p:presentation xmlns:a="http://schemas.openxmlformats.org/drawingml/2006/main" xmlns:r="http://schemas.openxmlformats.org/officeDocument/2006/relationships" xmlns:p="http://schemas.openxmlformats.org/presentationml/2006/main" embedTrueTypeFonts="1" saveSubsetFonts="1">
   <p:sldMasterIdLst>
     <p:sldMasterId id="2147483648" r:id="rId1"/>
   </p:sldMasterIdLst>
@@ -31,6 +31,24 @@
   </p:sldIdLst>
   <p:sldSz cx="12192000" cy="6858000"/>
   <p:notesSz cx="6858000" cy="9144000"/>
+  <p:embeddedFontLst>
+    <p:embeddedFont>
+      <p:font typeface="Blackout" panose="02000506000000020004" pitchFamily="2" charset="0"/>
+      <p:regular r:id="rId25"/>
+    </p:embeddedFont>
+    <p:embeddedFont>
+      <p:font typeface="Calibri Light" panose="020F0302020204030204" pitchFamily="34" charset="0"/>
+      <p:regular r:id="rId26"/>
+      <p:italic r:id="rId27"/>
+    </p:embeddedFont>
+    <p:embeddedFont>
+      <p:font typeface="Calibri" panose="020F0502020204030204" pitchFamily="34" charset="0"/>
+      <p:regular r:id="rId28"/>
+      <p:bold r:id="rId29"/>
+      <p:italic r:id="rId30"/>
+      <p:boldItalic r:id="rId31"/>
+    </p:embeddedFont>
+  </p:embeddedFontLst>
   <p:defaultTextStyle>
     <a:defPPr>
       <a:defRPr lang="en-US"/>
@@ -176,7 +194,7 @@
           </a:lstStyle>
           <a:p>
             <a:r>
-              <a:rPr lang="it-IT" smtClean="0"/>
+              <a:rPr lang="it-IT"/>
               <a:t>Fare clic per modificare lo stile del titolo</a:t>
             </a:r>
             <a:endParaRPr lang="en-US"/>
@@ -241,7 +259,7 @@
           </a:lstStyle>
           <a:p>
             <a:r>
-              <a:rPr lang="it-IT" smtClean="0"/>
+              <a:rPr lang="it-IT"/>
               <a:t>Fare clic per modificare lo stile del sottotitolo dello schema</a:t>
             </a:r>
             <a:endParaRPr lang="en-US"/>
@@ -265,7 +283,7 @@
           <a:p>
             <a:fld id="{8BA09A03-D57A-44AC-B23C-41C77AA6B08B}" type="datetimeFigureOut">
               <a:rPr lang="en-US" smtClean="0"/>
-              <a:t>2/17/2016</a:t>
+              <a:t>2/26/2016</a:t>
             </a:fld>
             <a:endParaRPr lang="en-US"/>
           </a:p>
@@ -359,7 +377,7 @@
           <a:lstStyle/>
           <a:p>
             <a:r>
-              <a:rPr lang="it-IT" smtClean="0"/>
+              <a:rPr lang="it-IT"/>
               <a:t>Fare clic per modificare lo stile del titolo</a:t>
             </a:r>
             <a:endParaRPr lang="en-US"/>
@@ -383,35 +401,35 @@
           <a:p>
             <a:pPr lvl="0"/>
             <a:r>
-              <a:rPr lang="it-IT" smtClean="0"/>
+              <a:rPr lang="it-IT"/>
               <a:t>Modifica gli stili del testo dello schema</a:t>
             </a:r>
           </a:p>
           <a:p>
             <a:pPr lvl="1"/>
             <a:r>
-              <a:rPr lang="it-IT" smtClean="0"/>
+              <a:rPr lang="it-IT"/>
               <a:t>Secondo livello</a:t>
             </a:r>
           </a:p>
           <a:p>
             <a:pPr lvl="2"/>
             <a:r>
-              <a:rPr lang="it-IT" smtClean="0"/>
+              <a:rPr lang="it-IT"/>
               <a:t>Terzo livello</a:t>
             </a:r>
           </a:p>
           <a:p>
             <a:pPr lvl="3"/>
             <a:r>
-              <a:rPr lang="it-IT" smtClean="0"/>
+              <a:rPr lang="it-IT"/>
               <a:t>Quarto livello</a:t>
             </a:r>
           </a:p>
           <a:p>
             <a:pPr lvl="4"/>
             <a:r>
-              <a:rPr lang="it-IT" smtClean="0"/>
+              <a:rPr lang="it-IT"/>
               <a:t>Quinto livello</a:t>
             </a:r>
             <a:endParaRPr lang="en-US"/>
@@ -435,7 +453,7 @@
           <a:p>
             <a:fld id="{8BA09A03-D57A-44AC-B23C-41C77AA6B08B}" type="datetimeFigureOut">
               <a:rPr lang="en-US" smtClean="0"/>
-              <a:t>2/17/2016</a:t>
+              <a:t>2/26/2016</a:t>
             </a:fld>
             <a:endParaRPr lang="en-US"/>
           </a:p>
@@ -534,7 +552,7 @@
           <a:lstStyle/>
           <a:p>
             <a:r>
-              <a:rPr lang="it-IT" smtClean="0"/>
+              <a:rPr lang="it-IT"/>
               <a:t>Fare clic per modificare lo stile del titolo</a:t>
             </a:r>
             <a:endParaRPr lang="en-US"/>
@@ -563,35 +581,35 @@
           <a:p>
             <a:pPr lvl="0"/>
             <a:r>
-              <a:rPr lang="it-IT" smtClean="0"/>
+              <a:rPr lang="it-IT"/>
               <a:t>Modifica gli stili del testo dello schema</a:t>
             </a:r>
           </a:p>
           <a:p>
             <a:pPr lvl="1"/>
             <a:r>
-              <a:rPr lang="it-IT" smtClean="0"/>
+              <a:rPr lang="it-IT"/>
               <a:t>Secondo livello</a:t>
             </a:r>
           </a:p>
           <a:p>
             <a:pPr lvl="2"/>
             <a:r>
-              <a:rPr lang="it-IT" smtClean="0"/>
+              <a:rPr lang="it-IT"/>
               <a:t>Terzo livello</a:t>
             </a:r>
           </a:p>
           <a:p>
             <a:pPr lvl="3"/>
             <a:r>
-              <a:rPr lang="it-IT" smtClean="0"/>
+              <a:rPr lang="it-IT"/>
               <a:t>Quarto livello</a:t>
             </a:r>
           </a:p>
           <a:p>
             <a:pPr lvl="4"/>
             <a:r>
-              <a:rPr lang="it-IT" smtClean="0"/>
+              <a:rPr lang="it-IT"/>
               <a:t>Quinto livello</a:t>
             </a:r>
             <a:endParaRPr lang="en-US"/>
@@ -615,7 +633,7 @@
           <a:p>
             <a:fld id="{8BA09A03-D57A-44AC-B23C-41C77AA6B08B}" type="datetimeFigureOut">
               <a:rPr lang="en-US" smtClean="0"/>
-              <a:t>2/17/2016</a:t>
+              <a:t>2/26/2016</a:t>
             </a:fld>
             <a:endParaRPr lang="en-US"/>
           </a:p>
@@ -715,7 +733,7 @@
           </a:lstStyle>
           <a:p>
             <a:r>
-              <a:rPr lang="it-IT" dirty="0" smtClean="0"/>
+              <a:rPr lang="it-IT" dirty="0"/>
               <a:t>FARE CLIC PER MODIFICARE LO STILE DEL TITOLO</a:t>
             </a:r>
             <a:endParaRPr lang="en-US" dirty="0"/>
@@ -770,35 +788,35 @@
           <a:p>
             <a:pPr lvl="0"/>
             <a:r>
-              <a:rPr lang="it-IT" dirty="0" smtClean="0"/>
+              <a:rPr lang="it-IT" dirty="0"/>
               <a:t>Modifica gli stili del testo dello schema</a:t>
             </a:r>
           </a:p>
           <a:p>
             <a:pPr lvl="1"/>
             <a:r>
-              <a:rPr lang="it-IT" dirty="0" smtClean="0"/>
+              <a:rPr lang="it-IT" dirty="0"/>
               <a:t>Secondo livello</a:t>
             </a:r>
           </a:p>
           <a:p>
             <a:pPr lvl="2"/>
             <a:r>
-              <a:rPr lang="it-IT" dirty="0" smtClean="0"/>
+              <a:rPr lang="it-IT" dirty="0"/>
               <a:t>Terzo livello</a:t>
             </a:r>
           </a:p>
           <a:p>
             <a:pPr lvl="3"/>
             <a:r>
-              <a:rPr lang="it-IT" dirty="0" smtClean="0"/>
+              <a:rPr lang="it-IT" dirty="0"/>
               <a:t>Quarto livello</a:t>
             </a:r>
           </a:p>
           <a:p>
             <a:pPr lvl="4"/>
             <a:r>
-              <a:rPr lang="it-IT" dirty="0" smtClean="0"/>
+              <a:rPr lang="it-IT" dirty="0"/>
               <a:t>Quinto livello</a:t>
             </a:r>
             <a:endParaRPr lang="en-US" dirty="0"/>
@@ -822,7 +840,7 @@
           <a:p>
             <a:fld id="{8BA09A03-D57A-44AC-B23C-41C77AA6B08B}" type="datetimeFigureOut">
               <a:rPr lang="en-US" smtClean="0"/>
-              <a:t>2/17/2016</a:t>
+              <a:t>2/26/2016</a:t>
             </a:fld>
             <a:endParaRPr lang="en-US"/>
           </a:p>
@@ -976,7 +994,7 @@
           </a:lstStyle>
           <a:p>
             <a:r>
-              <a:rPr lang="it-IT" smtClean="0"/>
+              <a:rPr lang="it-IT"/>
               <a:t>Fare clic per modificare lo stile del titolo</a:t>
             </a:r>
             <a:endParaRPr lang="en-US"/>
@@ -1096,7 +1114,7 @@
           <a:p>
             <a:pPr lvl="0"/>
             <a:r>
-              <a:rPr lang="it-IT" smtClean="0"/>
+              <a:rPr lang="it-IT"/>
               <a:t>Modifica gli stili del testo dello schema</a:t>
             </a:r>
           </a:p>
@@ -1119,7 +1137,7 @@
           <a:p>
             <a:fld id="{8BA09A03-D57A-44AC-B23C-41C77AA6B08B}" type="datetimeFigureOut">
               <a:rPr lang="en-US" smtClean="0"/>
-              <a:t>2/17/2016</a:t>
+              <a:t>2/26/2016</a:t>
             </a:fld>
             <a:endParaRPr lang="en-US"/>
           </a:p>
@@ -1213,7 +1231,7 @@
           <a:lstStyle/>
           <a:p>
             <a:r>
-              <a:rPr lang="it-IT" smtClean="0"/>
+              <a:rPr lang="it-IT"/>
               <a:t>Fare clic per modificare lo stile del titolo</a:t>
             </a:r>
             <a:endParaRPr lang="en-US"/>
@@ -1242,35 +1260,35 @@
           <a:p>
             <a:pPr lvl="0"/>
             <a:r>
-              <a:rPr lang="it-IT" smtClean="0"/>
+              <a:rPr lang="it-IT"/>
               <a:t>Modifica gli stili del testo dello schema</a:t>
             </a:r>
           </a:p>
           <a:p>
             <a:pPr lvl="1"/>
             <a:r>
-              <a:rPr lang="it-IT" smtClean="0"/>
+              <a:rPr lang="it-IT"/>
               <a:t>Secondo livello</a:t>
             </a:r>
           </a:p>
           <a:p>
             <a:pPr lvl="2"/>
             <a:r>
-              <a:rPr lang="it-IT" smtClean="0"/>
+              <a:rPr lang="it-IT"/>
               <a:t>Terzo livello</a:t>
             </a:r>
           </a:p>
           <a:p>
             <a:pPr lvl="3"/>
             <a:r>
-              <a:rPr lang="it-IT" smtClean="0"/>
+              <a:rPr lang="it-IT"/>
               <a:t>Quarto livello</a:t>
             </a:r>
           </a:p>
           <a:p>
             <a:pPr lvl="4"/>
             <a:r>
-              <a:rPr lang="it-IT" smtClean="0"/>
+              <a:rPr lang="it-IT"/>
               <a:t>Quinto livello</a:t>
             </a:r>
             <a:endParaRPr lang="en-US"/>
@@ -1299,35 +1317,35 @@
           <a:p>
             <a:pPr lvl="0"/>
             <a:r>
-              <a:rPr lang="it-IT" smtClean="0"/>
+              <a:rPr lang="it-IT"/>
               <a:t>Modifica gli stili del testo dello schema</a:t>
             </a:r>
           </a:p>
           <a:p>
             <a:pPr lvl="1"/>
             <a:r>
-              <a:rPr lang="it-IT" smtClean="0"/>
+              <a:rPr lang="it-IT"/>
               <a:t>Secondo livello</a:t>
             </a:r>
           </a:p>
           <a:p>
             <a:pPr lvl="2"/>
             <a:r>
-              <a:rPr lang="it-IT" smtClean="0"/>
+              <a:rPr lang="it-IT"/>
               <a:t>Terzo livello</a:t>
             </a:r>
           </a:p>
           <a:p>
             <a:pPr lvl="3"/>
             <a:r>
-              <a:rPr lang="it-IT" smtClean="0"/>
+              <a:rPr lang="it-IT"/>
               <a:t>Quarto livello</a:t>
             </a:r>
           </a:p>
           <a:p>
             <a:pPr lvl="4"/>
             <a:r>
-              <a:rPr lang="it-IT" smtClean="0"/>
+              <a:rPr lang="it-IT"/>
               <a:t>Quinto livello</a:t>
             </a:r>
             <a:endParaRPr lang="en-US"/>
@@ -1351,7 +1369,7 @@
           <a:p>
             <a:fld id="{8BA09A03-D57A-44AC-B23C-41C77AA6B08B}" type="datetimeFigureOut">
               <a:rPr lang="en-US" smtClean="0"/>
-              <a:t>2/17/2016</a:t>
+              <a:t>2/26/2016</a:t>
             </a:fld>
             <a:endParaRPr lang="en-US"/>
           </a:p>
@@ -1450,7 +1468,7 @@
           <a:lstStyle/>
           <a:p>
             <a:r>
-              <a:rPr lang="it-IT" smtClean="0"/>
+              <a:rPr lang="it-IT"/>
               <a:t>Fare clic per modificare lo stile del titolo</a:t>
             </a:r>
             <a:endParaRPr lang="en-US"/>
@@ -1516,7 +1534,7 @@
           <a:p>
             <a:pPr lvl="0"/>
             <a:r>
-              <a:rPr lang="it-IT" smtClean="0"/>
+              <a:rPr lang="it-IT"/>
               <a:t>Modifica gli stili del testo dello schema</a:t>
             </a:r>
           </a:p>
@@ -1544,35 +1562,35 @@
           <a:p>
             <a:pPr lvl="0"/>
             <a:r>
-              <a:rPr lang="it-IT" smtClean="0"/>
+              <a:rPr lang="it-IT"/>
               <a:t>Modifica gli stili del testo dello schema</a:t>
             </a:r>
           </a:p>
           <a:p>
             <a:pPr lvl="1"/>
             <a:r>
-              <a:rPr lang="it-IT" smtClean="0"/>
+              <a:rPr lang="it-IT"/>
               <a:t>Secondo livello</a:t>
             </a:r>
           </a:p>
           <a:p>
             <a:pPr lvl="2"/>
             <a:r>
-              <a:rPr lang="it-IT" smtClean="0"/>
+              <a:rPr lang="it-IT"/>
               <a:t>Terzo livello</a:t>
             </a:r>
           </a:p>
           <a:p>
             <a:pPr lvl="3"/>
             <a:r>
-              <a:rPr lang="it-IT" smtClean="0"/>
+              <a:rPr lang="it-IT"/>
               <a:t>Quarto livello</a:t>
             </a:r>
           </a:p>
           <a:p>
             <a:pPr lvl="4"/>
             <a:r>
-              <a:rPr lang="it-IT" smtClean="0"/>
+              <a:rPr lang="it-IT"/>
               <a:t>Quinto livello</a:t>
             </a:r>
             <a:endParaRPr lang="en-US"/>
@@ -1638,7 +1656,7 @@
           <a:p>
             <a:pPr lvl="0"/>
             <a:r>
-              <a:rPr lang="it-IT" smtClean="0"/>
+              <a:rPr lang="it-IT"/>
               <a:t>Modifica gli stili del testo dello schema</a:t>
             </a:r>
           </a:p>
@@ -1666,35 +1684,35 @@
           <a:p>
             <a:pPr lvl="0"/>
             <a:r>
-              <a:rPr lang="it-IT" smtClean="0"/>
+              <a:rPr lang="it-IT"/>
               <a:t>Modifica gli stili del testo dello schema</a:t>
             </a:r>
           </a:p>
           <a:p>
             <a:pPr lvl="1"/>
             <a:r>
-              <a:rPr lang="it-IT" smtClean="0"/>
+              <a:rPr lang="it-IT"/>
               <a:t>Secondo livello</a:t>
             </a:r>
           </a:p>
           <a:p>
             <a:pPr lvl="2"/>
             <a:r>
-              <a:rPr lang="it-IT" smtClean="0"/>
+              <a:rPr lang="it-IT"/>
               <a:t>Terzo livello</a:t>
             </a:r>
           </a:p>
           <a:p>
             <a:pPr lvl="3"/>
             <a:r>
-              <a:rPr lang="it-IT" smtClean="0"/>
+              <a:rPr lang="it-IT"/>
               <a:t>Quarto livello</a:t>
             </a:r>
           </a:p>
           <a:p>
             <a:pPr lvl="4"/>
             <a:r>
-              <a:rPr lang="it-IT" smtClean="0"/>
+              <a:rPr lang="it-IT"/>
               <a:t>Quinto livello</a:t>
             </a:r>
             <a:endParaRPr lang="en-US"/>
@@ -1718,7 +1736,7 @@
           <a:p>
             <a:fld id="{8BA09A03-D57A-44AC-B23C-41C77AA6B08B}" type="datetimeFigureOut">
               <a:rPr lang="en-US" smtClean="0"/>
-              <a:t>2/17/2016</a:t>
+              <a:t>2/26/2016</a:t>
             </a:fld>
             <a:endParaRPr lang="en-US"/>
           </a:p>
@@ -1812,7 +1830,7 @@
           <a:lstStyle/>
           <a:p>
             <a:r>
-              <a:rPr lang="it-IT" smtClean="0"/>
+              <a:rPr lang="it-IT"/>
               <a:t>Fare clic per modificare lo stile del titolo</a:t>
             </a:r>
             <a:endParaRPr lang="en-US"/>
@@ -1836,7 +1854,7 @@
           <a:p>
             <a:fld id="{8BA09A03-D57A-44AC-B23C-41C77AA6B08B}" type="datetimeFigureOut">
               <a:rPr lang="en-US" smtClean="0"/>
-              <a:t>2/17/2016</a:t>
+              <a:t>2/26/2016</a:t>
             </a:fld>
             <a:endParaRPr lang="en-US"/>
           </a:p>
@@ -1931,7 +1949,7 @@
           <a:p>
             <a:fld id="{8BA09A03-D57A-44AC-B23C-41C77AA6B08B}" type="datetimeFigureOut">
               <a:rPr lang="en-US" smtClean="0"/>
-              <a:t>2/17/2016</a:t>
+              <a:t>2/26/2016</a:t>
             </a:fld>
             <a:endParaRPr lang="en-US"/>
           </a:p>
@@ -2034,7 +2052,7 @@
           </a:lstStyle>
           <a:p>
             <a:r>
-              <a:rPr lang="it-IT" smtClean="0"/>
+              <a:rPr lang="it-IT"/>
               <a:t>Fare clic per modificare lo stile del titolo</a:t>
             </a:r>
             <a:endParaRPr lang="en-US"/>
@@ -2091,35 +2109,35 @@
           <a:p>
             <a:pPr lvl="0"/>
             <a:r>
-              <a:rPr lang="it-IT" smtClean="0"/>
+              <a:rPr lang="it-IT"/>
               <a:t>Modifica gli stili del testo dello schema</a:t>
             </a:r>
           </a:p>
           <a:p>
             <a:pPr lvl="1"/>
             <a:r>
-              <a:rPr lang="it-IT" smtClean="0"/>
+              <a:rPr lang="it-IT"/>
               <a:t>Secondo livello</a:t>
             </a:r>
           </a:p>
           <a:p>
             <a:pPr lvl="2"/>
             <a:r>
-              <a:rPr lang="it-IT" smtClean="0"/>
+              <a:rPr lang="it-IT"/>
               <a:t>Terzo livello</a:t>
             </a:r>
           </a:p>
           <a:p>
             <a:pPr lvl="3"/>
             <a:r>
-              <a:rPr lang="it-IT" smtClean="0"/>
+              <a:rPr lang="it-IT"/>
               <a:t>Quarto livello</a:t>
             </a:r>
           </a:p>
           <a:p>
             <a:pPr lvl="4"/>
             <a:r>
-              <a:rPr lang="it-IT" smtClean="0"/>
+              <a:rPr lang="it-IT"/>
               <a:t>Quinto livello</a:t>
             </a:r>
             <a:endParaRPr lang="en-US"/>
@@ -2185,7 +2203,7 @@
           <a:p>
             <a:pPr lvl="0"/>
             <a:r>
-              <a:rPr lang="it-IT" smtClean="0"/>
+              <a:rPr lang="it-IT"/>
               <a:t>Modifica gli stili del testo dello schema</a:t>
             </a:r>
           </a:p>
@@ -2208,7 +2226,7 @@
           <a:p>
             <a:fld id="{8BA09A03-D57A-44AC-B23C-41C77AA6B08B}" type="datetimeFigureOut">
               <a:rPr lang="en-US" smtClean="0"/>
-              <a:t>2/17/2016</a:t>
+              <a:t>2/26/2016</a:t>
             </a:fld>
             <a:endParaRPr lang="en-US"/>
           </a:p>
@@ -2311,7 +2329,7 @@
           </a:lstStyle>
           <a:p>
             <a:r>
-              <a:rPr lang="it-IT" smtClean="0"/>
+              <a:rPr lang="it-IT"/>
               <a:t>Fare clic per modificare lo stile del titolo</a:t>
             </a:r>
             <a:endParaRPr lang="en-US"/>
@@ -2438,7 +2456,7 @@
           <a:p>
             <a:pPr lvl="0"/>
             <a:r>
-              <a:rPr lang="it-IT" smtClean="0"/>
+              <a:rPr lang="it-IT"/>
               <a:t>Modifica gli stili del testo dello schema</a:t>
             </a:r>
           </a:p>
@@ -2461,7 +2479,7 @@
           <a:p>
             <a:fld id="{8BA09A03-D57A-44AC-B23C-41C77AA6B08B}" type="datetimeFigureOut">
               <a:rPr lang="en-US" smtClean="0"/>
-              <a:t>2/17/2016</a:t>
+              <a:t>2/26/2016</a:t>
             </a:fld>
             <a:endParaRPr lang="en-US"/>
           </a:p>
@@ -2570,7 +2588,7 @@
           <a:lstStyle/>
           <a:p>
             <a:r>
-              <a:rPr lang="it-IT" smtClean="0"/>
+              <a:rPr lang="it-IT"/>
               <a:t>Fare clic per modificare lo stile del titolo</a:t>
             </a:r>
             <a:endParaRPr lang="en-US"/>
@@ -2604,35 +2622,35 @@
           <a:p>
             <a:pPr lvl="0"/>
             <a:r>
-              <a:rPr lang="it-IT" smtClean="0"/>
+              <a:rPr lang="it-IT"/>
               <a:t>Modifica gli stili del testo dello schema</a:t>
             </a:r>
           </a:p>
           <a:p>
             <a:pPr lvl="1"/>
             <a:r>
-              <a:rPr lang="it-IT" smtClean="0"/>
+              <a:rPr lang="it-IT"/>
               <a:t>Secondo livello</a:t>
             </a:r>
           </a:p>
           <a:p>
             <a:pPr lvl="2"/>
             <a:r>
-              <a:rPr lang="it-IT" smtClean="0"/>
+              <a:rPr lang="it-IT"/>
               <a:t>Terzo livello</a:t>
             </a:r>
           </a:p>
           <a:p>
             <a:pPr lvl="3"/>
             <a:r>
-              <a:rPr lang="it-IT" smtClean="0"/>
+              <a:rPr lang="it-IT"/>
               <a:t>Quarto livello</a:t>
             </a:r>
           </a:p>
           <a:p>
             <a:pPr lvl="4"/>
             <a:r>
-              <a:rPr lang="it-IT" smtClean="0"/>
+              <a:rPr lang="it-IT"/>
               <a:t>Quinto livello</a:t>
             </a:r>
             <a:endParaRPr lang="en-US"/>
@@ -2674,7 +2692,7 @@
           <a:p>
             <a:fld id="{8BA09A03-D57A-44AC-B23C-41C77AA6B08B}" type="datetimeFigureOut">
               <a:rPr lang="en-US" smtClean="0"/>
-              <a:t>2/17/2016</a:t>
+              <a:t>2/26/2016</a:t>
             </a:fld>
             <a:endParaRPr lang="en-US"/>
           </a:p>
@@ -3146,7 +3164,7 @@
           <a:lstStyle/>
           <a:p>
             <a:r>
-              <a:rPr lang="it-IT" sz="3800" dirty="0" smtClean="0">
+              <a:rPr lang="it-IT" sz="3800" dirty="0">
                 <a:latin typeface="Blackout" panose="02000506000000020004" pitchFamily="2" charset="0"/>
               </a:rPr>
               <a:t>MY TAXI SERVICE</a:t>
@@ -3181,14 +3199,14 @@
           <a:p>
             <a:pPr algn="ctr"/>
             <a:r>
-              <a:rPr lang="it-IT" sz="2800" b="1" dirty="0" smtClean="0">
+              <a:rPr lang="it-IT" sz="2800" b="1" dirty="0">
                 <a:solidFill>
                   <a:schemeClr val="bg1"/>
                 </a:solidFill>
               </a:rPr>
               <a:t>BALDASSARI</a:t>
             </a:r>
-            <a:endParaRPr lang="it-IT" sz="2600" b="1" dirty="0" smtClean="0">
+            <a:endParaRPr lang="it-IT" sz="2600" b="1" dirty="0">
               <a:solidFill>
                 <a:schemeClr val="bg1"/>
               </a:solidFill>
@@ -3197,7 +3215,7 @@
           <a:p>
             <a:pPr algn="ctr"/>
             <a:r>
-              <a:rPr lang="it-IT" sz="2400" dirty="0" smtClean="0">
+              <a:rPr lang="it-IT" sz="2400" dirty="0">
                 <a:solidFill>
                   <a:schemeClr val="bg1"/>
                 </a:solidFill>
@@ -3208,7 +3226,7 @@
           <a:p>
             <a:pPr algn="ctr"/>
             <a:r>
-              <a:rPr lang="it-IT" sz="2000" dirty="0" smtClean="0">
+              <a:rPr lang="it-IT" sz="2000" dirty="0">
                 <a:solidFill>
                   <a:schemeClr val="bg1"/>
                 </a:solidFill>
@@ -3247,14 +3265,14 @@
           <a:p>
             <a:pPr algn="ctr"/>
             <a:r>
-              <a:rPr lang="it-IT" sz="2800" b="1" dirty="0" smtClean="0">
+              <a:rPr lang="it-IT" sz="2800" b="1" dirty="0">
                 <a:solidFill>
                   <a:schemeClr val="bg1"/>
                 </a:solidFill>
               </a:rPr>
               <a:t>BENDIN</a:t>
             </a:r>
-            <a:endParaRPr lang="it-IT" sz="2400" b="1" dirty="0" smtClean="0">
+            <a:endParaRPr lang="it-IT" sz="2400" b="1" dirty="0">
               <a:solidFill>
                 <a:schemeClr val="bg1"/>
               </a:solidFill>
@@ -3263,7 +3281,7 @@
           <a:p>
             <a:pPr algn="ctr"/>
             <a:r>
-              <a:rPr lang="it-IT" sz="2400" dirty="0" smtClean="0">
+              <a:rPr lang="it-IT" sz="2400" dirty="0">
                 <a:solidFill>
                   <a:schemeClr val="bg1"/>
                 </a:solidFill>
@@ -3274,14 +3292,14 @@
           <a:p>
             <a:pPr algn="ctr"/>
             <a:r>
-              <a:rPr lang="it-IT" sz="2000" dirty="0" smtClean="0">
+              <a:rPr lang="it-IT" sz="2000" dirty="0">
                 <a:solidFill>
                   <a:schemeClr val="bg1"/>
                 </a:solidFill>
               </a:rPr>
               <a:t>841734</a:t>
             </a:r>
-            <a:endParaRPr lang="it-IT" sz="2400" dirty="0" smtClean="0">
+            <a:endParaRPr lang="it-IT" sz="2400" dirty="0">
               <a:solidFill>
                 <a:schemeClr val="bg1"/>
               </a:solidFill>
@@ -3313,14 +3331,14 @@
           <a:p>
             <a:pPr algn="ctr"/>
             <a:r>
-              <a:rPr lang="it-IT" sz="2800" b="1" dirty="0" smtClean="0">
+              <a:rPr lang="it-IT" sz="2800" b="1" dirty="0">
                 <a:solidFill>
                   <a:schemeClr val="bg1"/>
                 </a:solidFill>
               </a:rPr>
               <a:t>GIAROLA</a:t>
             </a:r>
-            <a:endParaRPr lang="it-IT" sz="2400" b="1" dirty="0" smtClean="0">
+            <a:endParaRPr lang="it-IT" sz="2400" b="1" dirty="0">
               <a:solidFill>
                 <a:schemeClr val="bg1"/>
               </a:solidFill>
@@ -3329,7 +3347,7 @@
           <a:p>
             <a:pPr algn="ctr"/>
             <a:r>
-              <a:rPr lang="it-IT" sz="2400" dirty="0" smtClean="0">
+              <a:rPr lang="it-IT" sz="2400" dirty="0">
                 <a:solidFill>
                   <a:schemeClr val="bg1"/>
                 </a:solidFill>
@@ -3340,14 +3358,14 @@
           <a:p>
             <a:pPr algn="ctr"/>
             <a:r>
-              <a:rPr lang="it-IT" sz="2000" dirty="0" smtClean="0">
+              <a:rPr lang="it-IT" sz="2000" dirty="0">
                 <a:solidFill>
                   <a:schemeClr val="bg1"/>
                 </a:solidFill>
               </a:rPr>
               <a:t>840554</a:t>
             </a:r>
-            <a:endParaRPr lang="it-IT" sz="2400" dirty="0" smtClean="0">
+            <a:endParaRPr lang="it-IT" sz="2400" dirty="0">
               <a:solidFill>
                 <a:schemeClr val="bg1"/>
               </a:solidFill>
@@ -3379,7 +3397,7 @@
           <a:p>
             <a:pPr algn="ctr"/>
             <a:r>
-              <a:rPr lang="it-IT" sz="2800" dirty="0" smtClean="0">
+              <a:rPr lang="it-IT" sz="2800" dirty="0">
                 <a:solidFill>
                   <a:schemeClr val="bg1"/>
                 </a:solidFill>
@@ -3390,7 +3408,7 @@
           <a:p>
             <a:pPr algn="ctr"/>
             <a:r>
-              <a:rPr lang="it-IT" sz="2800" dirty="0" smtClean="0">
+              <a:rPr lang="it-IT" sz="2800" dirty="0">
                 <a:solidFill>
                   <a:schemeClr val="bg1"/>
                 </a:solidFill>
@@ -3451,10 +3469,9 @@
           <a:lstStyle/>
           <a:p>
             <a:r>
-              <a:rPr lang="en-US" noProof="0" dirty="0" smtClean="0"/>
+              <a:rPr lang="en-US" noProof="0" dirty="0"/>
               <a:t>TAXI REQUEST</a:t>
             </a:r>
-            <a:endParaRPr lang="en-US" noProof="0" dirty="0"/>
           </a:p>
         </p:txBody>
       </p:sp>
@@ -3533,10 +3550,9 @@
           <a:lstStyle/>
           <a:p>
             <a:r>
-              <a:rPr lang="en-US" noProof="0" dirty="0" smtClean="0"/>
+              <a:rPr lang="en-US" noProof="0" dirty="0"/>
               <a:t>DELETE RESERVATION</a:t>
             </a:r>
-            <a:endParaRPr lang="en-US" noProof="0" dirty="0"/>
           </a:p>
         </p:txBody>
       </p:sp>
@@ -3615,10 +3631,9 @@
           <a:lstStyle/>
           <a:p>
             <a:r>
-              <a:rPr lang="en-US" noProof="0" dirty="0" smtClean="0"/>
+              <a:rPr lang="en-US" noProof="0" dirty="0"/>
               <a:t>FAIR QUEUE MANAGEMENT</a:t>
             </a:r>
-            <a:endParaRPr lang="en-US" noProof="0" dirty="0"/>
           </a:p>
         </p:txBody>
       </p:sp>
@@ -3718,10 +3733,9 @@
           <a:lstStyle/>
           <a:p>
             <a:r>
-              <a:rPr lang="it-IT" sz="4400" dirty="0" smtClean="0"/>
+              <a:rPr lang="it-IT" sz="4400" dirty="0"/>
               <a:t>RIDE CREATION</a:t>
             </a:r>
-            <a:endParaRPr lang="it-IT" sz="4400" dirty="0"/>
           </a:p>
         </p:txBody>
       </p:sp>
@@ -3771,10 +3785,9 @@
           <a:lstStyle/>
           <a:p>
             <a:r>
-              <a:rPr lang="en-US" noProof="0" dirty="0" smtClean="0"/>
+              <a:rPr lang="en-US" noProof="0" dirty="0"/>
               <a:t>SEQUENCE OF INTEGRATION</a:t>
             </a:r>
-            <a:endParaRPr lang="en-US" noProof="0" dirty="0"/>
           </a:p>
         </p:txBody>
       </p:sp>
@@ -3913,10 +3926,9 @@
           <a:lstStyle/>
           <a:p>
             <a:r>
-              <a:rPr lang="en-US" noProof="0" dirty="0" smtClean="0"/>
+              <a:rPr lang="en-US" noProof="0" dirty="0"/>
               <a:t>TAXI REQUEST TEST PROCEDURE</a:t>
             </a:r>
-            <a:endParaRPr lang="en-US" noProof="0" dirty="0"/>
           </a:p>
         </p:txBody>
       </p:sp>
@@ -4018,10 +4030,9 @@
           <a:lstStyle/>
           <a:p>
             <a:r>
-              <a:rPr lang="en-US" noProof="0" dirty="0" smtClean="0"/>
+              <a:rPr lang="en-US" noProof="0" dirty="0"/>
               <a:t>TESTS’ REQUIREMENTS</a:t>
             </a:r>
-            <a:endParaRPr lang="en-US" noProof="0" dirty="0"/>
           </a:p>
         </p:txBody>
       </p:sp>
@@ -4041,12 +4052,8 @@
           <a:lstStyle/>
           <a:p>
             <a:r>
-              <a:rPr lang="en-US" noProof="0" dirty="0" smtClean="0"/>
-              <a:t>Program </a:t>
-            </a:r>
-            <a:r>
-              <a:rPr lang="en-US" noProof="0" dirty="0" smtClean="0"/>
-              <a:t>Stubs</a:t>
+              <a:rPr lang="en-US" noProof="0" dirty="0"/>
+              <a:t>Program Stubs</a:t>
             </a:r>
           </a:p>
           <a:p>
@@ -4055,29 +4062,25 @@
               <a:t>	</a:t>
             </a:r>
             <a:r>
-              <a:rPr lang="en-US" sz="2400" noProof="0" dirty="0" smtClean="0"/>
+              <a:rPr lang="en-US" sz="2400" noProof="0" dirty="0"/>
               <a:t>External Notification Service</a:t>
             </a:r>
           </a:p>
           <a:p>
             <a:r>
               <a:rPr lang="en-US" sz="2400" noProof="0" dirty="0"/>
-              <a:t>	</a:t>
-            </a:r>
-            <a:r>
-              <a:rPr lang="en-US" sz="2400" noProof="0" dirty="0" smtClean="0"/>
-              <a:t>External Payment Service</a:t>
-            </a:r>
-          </a:p>
-          <a:p>
-            <a:r>
-              <a:rPr lang="en-US" noProof="0" dirty="0" smtClean="0"/>
+              <a:t>	External Payment Service</a:t>
+            </a:r>
+          </a:p>
+          <a:p>
+            <a:r>
+              <a:rPr lang="en-US" noProof="0" dirty="0"/>
               <a:t>Program Drivers</a:t>
             </a:r>
           </a:p>
           <a:p>
             <a:r>
-              <a:rPr lang="en-US" noProof="0" dirty="0" smtClean="0"/>
+              <a:rPr lang="en-US" noProof="0" dirty="0"/>
               <a:t>Test Data</a:t>
             </a:r>
           </a:p>
@@ -4087,34 +4090,21 @@
               <a:t>	</a:t>
             </a:r>
             <a:r>
-              <a:rPr lang="en-US" sz="2400" noProof="0" dirty="0" smtClean="0"/>
-              <a:t>Users </a:t>
-            </a:r>
-            <a:r>
-              <a:rPr lang="en-US" sz="2400" noProof="0" dirty="0" smtClean="0"/>
-              <a:t>Data</a:t>
-            </a:r>
-          </a:p>
-          <a:p>
-            <a:r>
               <a:rPr lang="en-US" sz="2400" noProof="0" dirty="0"/>
-              <a:t>	</a:t>
-            </a:r>
-            <a:r>
-              <a:rPr lang="en-US" sz="2400" noProof="0" dirty="0" smtClean="0"/>
-              <a:t>Rides</a:t>
+              <a:t>Users Data</a:t>
             </a:r>
           </a:p>
           <a:p>
             <a:r>
               <a:rPr lang="en-US" sz="2400" noProof="0" dirty="0"/>
-              <a:t>	</a:t>
-            </a:r>
-            <a:r>
-              <a:rPr lang="en-US" sz="2400" noProof="0" dirty="0" smtClean="0"/>
-              <a:t>City Zones</a:t>
-            </a:r>
-            <a:endParaRPr lang="en-US" sz="2400" noProof="0" dirty="0"/>
+              <a:t>	Rides</a:t>
+            </a:r>
+          </a:p>
+          <a:p>
+            <a:r>
+              <a:rPr lang="en-US" sz="2400" noProof="0" dirty="0"/>
+              <a:t>	City Zones</a:t>
+            </a:r>
           </a:p>
         </p:txBody>
       </p:sp>
@@ -4164,10 +4154,9 @@
           <a:lstStyle/>
           <a:p>
             <a:r>
-              <a:rPr lang="en-US" noProof="0" dirty="0" smtClean="0"/>
+              <a:rPr lang="en-US" noProof="0" dirty="0"/>
               <a:t>COCOMO II - SETTINGS</a:t>
             </a:r>
-            <a:endParaRPr lang="en-US" noProof="0" dirty="0"/>
           </a:p>
         </p:txBody>
       </p:sp>
@@ -4476,10 +4465,9 @@
           <a:lstStyle/>
           <a:p>
             <a:r>
-              <a:rPr lang="en-US" noProof="0" dirty="0" smtClean="0"/>
+              <a:rPr lang="en-US" noProof="0" dirty="0"/>
               <a:t>COCOMO II - RESULT</a:t>
             </a:r>
-            <a:endParaRPr lang="en-US" noProof="0" dirty="0"/>
           </a:p>
         </p:txBody>
       </p:sp>
@@ -4563,10 +4551,9 @@
           <a:lstStyle/>
           <a:p>
             <a:r>
-              <a:rPr lang="en-US" noProof="0" dirty="0" smtClean="0"/>
+              <a:rPr lang="en-US" noProof="0" dirty="0"/>
               <a:t>TASK SCHEDULING</a:t>
             </a:r>
-            <a:endParaRPr lang="en-US" noProof="0" dirty="0"/>
           </a:p>
         </p:txBody>
       </p:sp>
@@ -4644,75 +4631,60 @@
           <a:lstStyle/>
           <a:p>
             <a:r>
-              <a:rPr lang="en-US" noProof="0" dirty="0" smtClean="0">
+              <a:rPr lang="en-US" noProof="0" dirty="0">
                 <a:latin typeface="Calibri" panose="020F0502020204030204" pitchFamily="34" charset="0"/>
               </a:rPr>
-              <a:t>MAIN </a:t>
-            </a:r>
-            <a:r>
-              <a:rPr lang="en-US" noProof="0" dirty="0" smtClean="0">
+              <a:t>MAIN STAKEHOLDERS &amp; ACTORS</a:t>
+            </a:r>
+          </a:p>
+        </p:txBody>
+      </p:sp>
+      <p:sp>
+        <p:nvSpPr>
+          <p:cNvPr id="3" name="Segnaposto contenuto 2"/>
+          <p:cNvSpPr>
+            <a:spLocks noGrp="1"/>
+          </p:cNvSpPr>
+          <p:nvPr>
+            <p:ph idx="1"/>
+          </p:nvPr>
+        </p:nvSpPr>
+        <p:spPr/>
+        <p:txBody>
+          <a:bodyPr/>
+          <a:lstStyle/>
+          <a:p>
+            <a:r>
+              <a:rPr lang="en-US" noProof="0" dirty="0">
                 <a:latin typeface="Calibri" panose="020F0502020204030204" pitchFamily="34" charset="0"/>
               </a:rPr>
-              <a:t>STAKEHOLDERS </a:t>
-            </a:r>
-            <a:r>
-              <a:rPr lang="en-US" noProof="0" dirty="0" smtClean="0">
+              <a:t>City Government</a:t>
+            </a:r>
+          </a:p>
+          <a:p>
+            <a:r>
+              <a:rPr lang="en-US" noProof="0" dirty="0">
                 <a:latin typeface="Calibri" panose="020F0502020204030204" pitchFamily="34" charset="0"/>
               </a:rPr>
-              <a:t>&amp; ACTORS</a:t>
-            </a:r>
+              <a:t>Taxi Company</a:t>
+            </a:r>
+          </a:p>
+          <a:p>
+            <a:r>
+              <a:rPr lang="en-US" noProof="0" dirty="0">
+                <a:latin typeface="Calibri" panose="020F0502020204030204" pitchFamily="34" charset="0"/>
+              </a:rPr>
+              <a:t>Clients</a:t>
+            </a:r>
+          </a:p>
+          <a:p>
             <a:endParaRPr lang="en-US" noProof="0" dirty="0">
               <a:latin typeface="Calibri" panose="020F0502020204030204" pitchFamily="34" charset="0"/>
             </a:endParaRPr>
           </a:p>
-        </p:txBody>
-      </p:sp>
-      <p:sp>
-        <p:nvSpPr>
-          <p:cNvPr id="3" name="Segnaposto contenuto 2"/>
-          <p:cNvSpPr>
-            <a:spLocks noGrp="1"/>
-          </p:cNvSpPr>
-          <p:nvPr>
-            <p:ph idx="1"/>
-          </p:nvPr>
-        </p:nvSpPr>
-        <p:spPr/>
-        <p:txBody>
-          <a:bodyPr/>
-          <a:lstStyle/>
-          <a:p>
-            <a:r>
-              <a:rPr lang="en-US" noProof="0" dirty="0" smtClean="0">
-                <a:latin typeface="Calibri" panose="020F0502020204030204" pitchFamily="34" charset="0"/>
-              </a:rPr>
-              <a:t>City Government</a:t>
-            </a:r>
-          </a:p>
-          <a:p>
-            <a:r>
-              <a:rPr lang="en-US" noProof="0" dirty="0" smtClean="0">
-                <a:latin typeface="Calibri" panose="020F0502020204030204" pitchFamily="34" charset="0"/>
-              </a:rPr>
-              <a:t>Taxi Company</a:t>
-            </a:r>
-          </a:p>
-          <a:p>
-            <a:r>
-              <a:rPr lang="en-US" noProof="0" dirty="0" smtClean="0">
-                <a:latin typeface="Calibri" panose="020F0502020204030204" pitchFamily="34" charset="0"/>
-              </a:rPr>
-              <a:t>Clients</a:t>
-            </a:r>
-          </a:p>
-          <a:p>
-            <a:endParaRPr lang="en-US" noProof="0" dirty="0" smtClean="0">
-              <a:latin typeface="Calibri" panose="020F0502020204030204" pitchFamily="34" charset="0"/>
-            </a:endParaRPr>
-          </a:p>
-          <a:p>
-            <a:r>
-              <a:rPr lang="en-US" noProof="0" dirty="0" smtClean="0">
+          <a:p>
+            <a:r>
+              <a:rPr lang="en-US" noProof="0" dirty="0">
                 <a:latin typeface="Calibri" panose="020F0502020204030204" pitchFamily="34" charset="0"/>
               </a:rPr>
               <a:t>Passenger</a:t>
@@ -4720,7 +4692,7 @@
           </a:p>
           <a:p>
             <a:r>
-              <a:rPr lang="en-US" noProof="0" dirty="0" smtClean="0">
+              <a:rPr lang="en-US" noProof="0" dirty="0">
                 <a:latin typeface="Calibri" panose="020F0502020204030204" pitchFamily="34" charset="0"/>
               </a:rPr>
               <a:t>Taxi Driver</a:t>
@@ -4728,14 +4700,11 @@
           </a:p>
           <a:p>
             <a:r>
-              <a:rPr lang="en-US" noProof="0" dirty="0" smtClean="0">
+              <a:rPr lang="en-US" noProof="0" dirty="0">
                 <a:latin typeface="Calibri" panose="020F0502020204030204" pitchFamily="34" charset="0"/>
               </a:rPr>
               <a:t>Administrator</a:t>
             </a:r>
-            <a:endParaRPr lang="en-US" noProof="0" dirty="0">
-              <a:latin typeface="Calibri" panose="020F0502020204030204" pitchFamily="34" charset="0"/>
-            </a:endParaRPr>
           </a:p>
         </p:txBody>
       </p:sp>
@@ -4785,12 +4754,8 @@
           <a:lstStyle/>
           <a:p>
             <a:r>
-              <a:rPr lang="en-US" noProof="0" dirty="0" smtClean="0"/>
-              <a:t>RESOURCES </a:t>
-            </a:r>
-            <a:r>
               <a:rPr lang="en-US" noProof="0" dirty="0"/>
-              <a:t>ALLOCATION</a:t>
+              <a:t>RESOURCES ALLOCATION</a:t>
             </a:r>
           </a:p>
         </p:txBody>
@@ -4870,108 +4835,73 @@
           <a:lstStyle/>
           <a:p>
             <a:r>
-              <a:rPr lang="en-US" noProof="0" dirty="0" smtClean="0"/>
+              <a:rPr lang="en-US" noProof="0" dirty="0"/>
               <a:t>RISK PLANNING &amp; MANAGEMENT</a:t>
             </a:r>
+          </a:p>
+        </p:txBody>
+      </p:sp>
+      <p:sp>
+        <p:nvSpPr>
+          <p:cNvPr id="3" name="Content Placeholder 2"/>
+          <p:cNvSpPr>
+            <a:spLocks noGrp="1"/>
+          </p:cNvSpPr>
+          <p:nvPr>
+            <p:ph idx="1"/>
+          </p:nvPr>
+        </p:nvSpPr>
+        <p:spPr/>
+        <p:txBody>
+          <a:bodyPr/>
+          <a:lstStyle/>
+          <a:p>
+            <a:r>
+              <a:rPr lang="en-US" i="1" noProof="0" dirty="0"/>
+              <a:t>Proactive</a:t>
+            </a:r>
+            <a:r>
+              <a:rPr lang="en-US" noProof="0" dirty="0"/>
+              <a:t> strategy</a:t>
+            </a:r>
+          </a:p>
+          <a:p>
             <a:endParaRPr lang="en-US" noProof="0" dirty="0"/>
           </a:p>
-        </p:txBody>
-      </p:sp>
-      <p:sp>
-        <p:nvSpPr>
-          <p:cNvPr id="3" name="Content Placeholder 2"/>
-          <p:cNvSpPr>
-            <a:spLocks noGrp="1"/>
-          </p:cNvSpPr>
-          <p:nvPr>
-            <p:ph idx="1"/>
-          </p:nvPr>
-        </p:nvSpPr>
-        <p:spPr/>
-        <p:txBody>
-          <a:bodyPr/>
-          <a:lstStyle/>
-          <a:p>
-            <a:r>
-              <a:rPr lang="en-US" i="1" noProof="0" dirty="0" smtClean="0"/>
-              <a:t>Proactive</a:t>
-            </a:r>
-            <a:r>
-              <a:rPr lang="en-US" noProof="0" dirty="0" smtClean="0"/>
-              <a:t> </a:t>
-            </a:r>
+          <a:p>
             <a:r>
               <a:rPr lang="en-US" noProof="0" dirty="0"/>
-              <a:t>strategy</a:t>
-            </a:r>
-            <a:endParaRPr lang="en-US" noProof="0" dirty="0" smtClean="0"/>
-          </a:p>
-          <a:p>
-            <a:endParaRPr lang="en-US" noProof="0" dirty="0" smtClean="0"/>
-          </a:p>
-          <a:p>
-            <a:r>
-              <a:rPr lang="en-US" noProof="0" dirty="0" smtClean="0"/>
-              <a:t>Unrealistic </a:t>
-            </a:r>
+              <a:t>Unrealistic schedule</a:t>
+            </a:r>
+          </a:p>
+          <a:p>
             <a:r>
               <a:rPr lang="en-US" noProof="0" dirty="0"/>
-              <a:t>schedule</a:t>
-            </a:r>
-          </a:p>
-          <a:p>
-            <a:r>
-              <a:rPr lang="en-US" noProof="0" dirty="0" smtClean="0"/>
-              <a:t>Availability </a:t>
-            </a:r>
+              <a:t>Availability of staff</a:t>
+            </a:r>
+          </a:p>
+          <a:p>
             <a:r>
               <a:rPr lang="en-US" noProof="0" dirty="0"/>
-              <a:t>of </a:t>
-            </a:r>
-            <a:r>
-              <a:rPr lang="en-US" noProof="0" dirty="0" smtClean="0"/>
-              <a:t>staff</a:t>
-            </a:r>
-            <a:endParaRPr lang="en-US" noProof="0" dirty="0"/>
-          </a:p>
-          <a:p>
-            <a:r>
-              <a:rPr lang="en-US" noProof="0" dirty="0" smtClean="0"/>
-              <a:t>Wrong </a:t>
-            </a:r>
+              <a:t>Wrong functionalities</a:t>
+            </a:r>
+          </a:p>
+          <a:p>
             <a:r>
               <a:rPr lang="en-US" noProof="0" dirty="0"/>
-              <a:t>functionalities</a:t>
-            </a:r>
-          </a:p>
-          <a:p>
-            <a:r>
-              <a:rPr lang="en-US" noProof="0" dirty="0" smtClean="0"/>
-              <a:t>Wrong </a:t>
-            </a:r>
+              <a:t>Wrong User Interface</a:t>
+            </a:r>
+          </a:p>
+          <a:p>
             <a:r>
               <a:rPr lang="en-US" noProof="0" dirty="0"/>
-              <a:t>User Interface</a:t>
-            </a:r>
-          </a:p>
-          <a:p>
-            <a:r>
-              <a:rPr lang="en-US" noProof="0" dirty="0" smtClean="0"/>
-              <a:t>Bad </a:t>
-            </a:r>
+              <a:t>Bad external components</a:t>
+            </a:r>
+          </a:p>
+          <a:p>
             <a:r>
               <a:rPr lang="en-US" noProof="0" dirty="0"/>
-              <a:t>external components</a:t>
-            </a:r>
-          </a:p>
-          <a:p>
-            <a:r>
-              <a:rPr lang="en-US" noProof="0" dirty="0" smtClean="0"/>
-              <a:t>Real-time </a:t>
-            </a:r>
-            <a:r>
-              <a:rPr lang="en-US" noProof="0" dirty="0"/>
-              <a:t>shortfalls</a:t>
+              <a:t>Real-time shortfalls</a:t>
             </a:r>
           </a:p>
         </p:txBody>
@@ -5022,10 +4952,9 @@
           <a:lstStyle/>
           <a:p>
             <a:r>
-              <a:rPr lang="en-US" dirty="0" smtClean="0"/>
+              <a:rPr lang="en-US" dirty="0"/>
               <a:t>PLACEHOLDER FOR CODE INSPECTION</a:t>
             </a:r>
-            <a:endParaRPr lang="en-US" dirty="0"/>
           </a:p>
         </p:txBody>
       </p:sp>
@@ -5094,7 +5023,7 @@
           <a:lstStyle/>
           <a:p>
             <a:r>
-              <a:rPr lang="en-US" smtClean="0"/>
+              <a:rPr lang="en-US"/>
               <a:t>PLACEHOLDER FOR THANK YOU</a:t>
             </a:r>
             <a:endParaRPr lang="en-US" dirty="0"/>
@@ -5166,10 +5095,9 @@
           <a:lstStyle/>
           <a:p>
             <a:r>
-              <a:rPr lang="en-US" noProof="0" dirty="0" smtClean="0"/>
+              <a:rPr lang="en-US" noProof="0" dirty="0"/>
               <a:t>MAIN GOALS</a:t>
             </a:r>
-            <a:endParaRPr lang="en-US" noProof="0" dirty="0"/>
           </a:p>
         </p:txBody>
       </p:sp>
@@ -5189,40 +5117,39 @@
           <a:lstStyle/>
           <a:p>
             <a:r>
-              <a:rPr lang="en-US" noProof="0" dirty="0" smtClean="0"/>
+              <a:rPr lang="en-US" noProof="0" dirty="0"/>
               <a:t>Web and Mobile application</a:t>
             </a:r>
           </a:p>
           <a:p>
             <a:r>
-              <a:rPr lang="en-US" noProof="0" dirty="0" smtClean="0"/>
+              <a:rPr lang="en-US" noProof="0" dirty="0"/>
               <a:t>Queue fair management</a:t>
             </a:r>
           </a:p>
           <a:p>
             <a:r>
-              <a:rPr lang="en-US" noProof="0" dirty="0" smtClean="0"/>
+              <a:rPr lang="en-US" noProof="0" dirty="0"/>
               <a:t>Ride Reservation</a:t>
             </a:r>
           </a:p>
           <a:p>
             <a:r>
-              <a:rPr lang="en-US" noProof="0" dirty="0" smtClean="0"/>
+              <a:rPr lang="en-US" noProof="0" dirty="0"/>
               <a:t>Multiple Notifications</a:t>
             </a:r>
           </a:p>
           <a:p>
             <a:r>
-              <a:rPr lang="en-US" noProof="0" dirty="0" smtClean="0"/>
+              <a:rPr lang="en-US" noProof="0" dirty="0"/>
               <a:t>Public API</a:t>
             </a:r>
           </a:p>
           <a:p>
             <a:r>
-              <a:rPr lang="en-US" noProof="0" dirty="0" smtClean="0"/>
+              <a:rPr lang="en-US" noProof="0" dirty="0"/>
               <a:t>Taxi Sharing </a:t>
             </a:r>
-            <a:endParaRPr lang="en-US" noProof="0" dirty="0"/>
           </a:p>
         </p:txBody>
       </p:sp>
@@ -5272,10 +5199,9 @@
           <a:lstStyle/>
           <a:p>
             <a:r>
-              <a:rPr lang="en-US" noProof="0" dirty="0" smtClean="0"/>
+              <a:rPr lang="en-US" noProof="0" dirty="0"/>
               <a:t>ASSUMPTIONS</a:t>
             </a:r>
-            <a:endParaRPr lang="en-US" noProof="0" dirty="0"/>
           </a:p>
         </p:txBody>
       </p:sp>
@@ -5295,54 +5221,53 @@
           <a:lstStyle/>
           <a:p>
             <a:r>
-              <a:rPr lang="en-US" noProof="0" dirty="0" smtClean="0"/>
+              <a:rPr lang="en-US" noProof="0" dirty="0"/>
               <a:t>Entitled Taxi Drivers</a:t>
             </a:r>
           </a:p>
           <a:p>
             <a:r>
-              <a:rPr lang="en-US" noProof="0" dirty="0" smtClean="0"/>
+              <a:rPr lang="en-US" noProof="0" dirty="0"/>
               <a:t>Predetermined City Zones</a:t>
             </a:r>
           </a:p>
           <a:p>
             <a:r>
-              <a:rPr lang="en-US" noProof="0" dirty="0" smtClean="0"/>
+              <a:rPr lang="en-US" noProof="0" dirty="0"/>
               <a:t>Taxi Driver manages his own availability</a:t>
             </a:r>
           </a:p>
           <a:p>
             <a:r>
-              <a:rPr lang="en-US" noProof="0" dirty="0" smtClean="0"/>
+              <a:rPr lang="en-US" noProof="0" dirty="0"/>
               <a:t>Ride is shared only if </a:t>
             </a:r>
             <a:r>
-              <a:rPr lang="en-US" dirty="0" smtClean="0"/>
+              <a:rPr lang="en-US" dirty="0"/>
               <a:t>it </a:t>
             </a:r>
             <a:r>
-              <a:rPr lang="en-US" noProof="0" dirty="0" smtClean="0"/>
+              <a:rPr lang="en-US" noProof="0" dirty="0"/>
               <a:t>is reserved</a:t>
             </a:r>
           </a:p>
           <a:p>
             <a:r>
-              <a:rPr lang="en-US" noProof="0" dirty="0" smtClean="0"/>
+              <a:rPr lang="en-US" noProof="0" dirty="0"/>
               <a:t>Shared rides have same pickup and destination zone</a:t>
             </a:r>
           </a:p>
           <a:p>
             <a:r>
-              <a:rPr lang="en-US" noProof="0" dirty="0" smtClean="0"/>
+              <a:rPr lang="en-US" noProof="0" dirty="0"/>
               <a:t>All taxis have the same capacity</a:t>
             </a:r>
           </a:p>
           <a:p>
             <a:r>
-              <a:rPr lang="en-US" noProof="0" dirty="0" smtClean="0"/>
+              <a:rPr lang="en-US" noProof="0" dirty="0"/>
               <a:t>Requests are turned into Rides after an appropriate time frame</a:t>
             </a:r>
-            <a:endParaRPr lang="en-US" noProof="0" dirty="0"/>
           </a:p>
         </p:txBody>
       </p:sp>
@@ -5413,10 +5338,9 @@
           <a:lstStyle/>
           <a:p>
             <a:r>
-              <a:rPr lang="it-IT" sz="4400" dirty="0" smtClean="0"/>
+              <a:rPr lang="it-IT" sz="4400" dirty="0"/>
               <a:t>USE CASE</a:t>
             </a:r>
-            <a:endParaRPr lang="it-IT" sz="4400" dirty="0"/>
           </a:p>
         </p:txBody>
       </p:sp>
@@ -5487,10 +5411,9 @@
           <a:lstStyle/>
           <a:p>
             <a:r>
-              <a:rPr lang="it-IT" sz="4400" dirty="0" smtClean="0"/>
+              <a:rPr lang="it-IT" sz="4400" dirty="0"/>
               <a:t>CLASS DIAGRAM</a:t>
             </a:r>
-            <a:endParaRPr lang="it-IT" sz="4400" dirty="0"/>
           </a:p>
         </p:txBody>
       </p:sp>
@@ -5561,10 +5484,9 @@
           <a:lstStyle/>
           <a:p>
             <a:r>
-              <a:rPr lang="it-IT" sz="4400" dirty="0" smtClean="0"/>
+              <a:rPr lang="it-IT" sz="4400" dirty="0"/>
               <a:t>ALLOY</a:t>
             </a:r>
-            <a:endParaRPr lang="it-IT" sz="4400" dirty="0"/>
           </a:p>
         </p:txBody>
       </p:sp>
@@ -5614,10 +5536,9 @@
           <a:lstStyle/>
           <a:p>
             <a:r>
-              <a:rPr lang="en-US" noProof="0" dirty="0" smtClean="0"/>
+              <a:rPr lang="en-US" noProof="0" dirty="0"/>
               <a:t>APPLICATION TIERS</a:t>
             </a:r>
-            <a:endParaRPr lang="en-US" noProof="0" dirty="0"/>
           </a:p>
         </p:txBody>
       </p:sp>
@@ -5717,16 +5638,15 @@
           <a:lstStyle/>
           <a:p>
             <a:r>
-              <a:rPr lang="it-IT" sz="3600" b="1" dirty="0" smtClean="0"/>
+              <a:rPr lang="it-IT" sz="3600" b="1" dirty="0"/>
               <a:t>HIGH LEVEL</a:t>
             </a:r>
           </a:p>
           <a:p>
             <a:r>
-              <a:rPr lang="it-IT" sz="3600" b="1" dirty="0" smtClean="0"/>
+              <a:rPr lang="it-IT" sz="3600" b="1" dirty="0"/>
               <a:t>COMPONENT VIEW</a:t>
             </a:r>
-            <a:endParaRPr lang="it-IT" sz="3600" b="1" dirty="0"/>
           </a:p>
         </p:txBody>
       </p:sp>

</xml_diff>